<commit_message>
added pptx and keynote with "code with me"
</commit_message>
<xml_diff>
--- a/install_CLION_WIN_sept2021.pptx
+++ b/install_CLION_WIN_sept2021.pptx
@@ -27,6 +27,7 @@
     <p:sldId id="272" r:id="rId24"/>
     <p:sldId id="273" r:id="rId25"/>
     <p:sldId id="274" r:id="rId26"/>
+    <p:sldId id="275" r:id="rId27"/>
   </p:sldIdLst>
   <p:sldSz cx="13004800" cy="9753600"/>
   <p:notesSz cx="6858000" cy="9144000"/>
@@ -4423,7 +4424,7 @@
       </p:grpSpPr>
       <p:sp>
         <p:nvSpPr>
-          <p:cNvPr id="199" name="Quando scaricato,…"/>
+          <p:cNvPr id="200" name="Quando scaricato,…"/>
           <p:cNvSpPr txBox="1"/>
           <p:nvPr>
             <p:ph type="body" idx="1"/>
@@ -4513,7 +4514,7 @@
       </p:sp>
       <p:pic>
         <p:nvPicPr>
-          <p:cNvPr id="200" name="Image" descr="Image"/>
+          <p:cNvPr id="201" name="Image" descr="Image"/>
           <p:cNvPicPr>
             <a:picLocks noChangeAspect="1"/>
           </p:cNvPicPr>
@@ -4543,7 +4544,7 @@
       </p:pic>
       <p:pic>
         <p:nvPicPr>
-          <p:cNvPr id="201" name="Image" descr="Image"/>
+          <p:cNvPr id="202" name="Image" descr="Image"/>
           <p:cNvPicPr>
             <a:picLocks noChangeAspect="1"/>
           </p:cNvPicPr>
@@ -4598,7 +4599,7 @@
       </p:grpSpPr>
       <p:sp>
         <p:nvSpPr>
-          <p:cNvPr id="203" name="Riaprire  CLion…"/>
+          <p:cNvPr id="204" name="Riaprire  CLion…"/>
           <p:cNvSpPr txBox="1"/>
           <p:nvPr>
             <p:ph type="body" idx="1"/>
@@ -4723,7 +4724,7 @@
       </p:grpSpPr>
       <p:sp>
         <p:nvSpPr>
-          <p:cNvPr id="205" name="A) da &quot;nuovo Progetto&quot;…"/>
+          <p:cNvPr id="206" name="A) da &quot;nuovo Progetto&quot;…"/>
           <p:cNvSpPr txBox="1"/>
           <p:nvPr>
             <p:ph type="body" idx="1"/>
@@ -4816,7 +4817,7 @@
       </p:sp>
       <p:pic>
         <p:nvPicPr>
-          <p:cNvPr id="206" name="Image" descr="Image"/>
+          <p:cNvPr id="207" name="Image" descr="Image"/>
           <p:cNvPicPr>
             <a:picLocks noChangeAspect="1"/>
           </p:cNvPicPr>
@@ -4845,7 +4846,7 @@
       </p:pic>
       <p:pic>
         <p:nvPicPr>
-          <p:cNvPr id="207" name="Image" descr="Image"/>
+          <p:cNvPr id="208" name="Image" descr="Image"/>
           <p:cNvPicPr>
             <a:picLocks noChangeAspect="1"/>
           </p:cNvPicPr>
@@ -4900,7 +4901,7 @@
       </p:grpSpPr>
       <p:sp>
         <p:nvSpPr>
-          <p:cNvPr id="209" name="Su &quot;+&quot;…"/>
+          <p:cNvPr id="210" name="Su &quot;+&quot;…"/>
           <p:cNvSpPr txBox="1"/>
           <p:nvPr>
             <p:ph type="body" idx="1"/>
@@ -4975,7 +4976,7 @@
       </p:sp>
       <p:pic>
         <p:nvPicPr>
-          <p:cNvPr id="210" name="Image" descr="Image"/>
+          <p:cNvPr id="211" name="Image" descr="Image"/>
           <p:cNvPicPr>
             <a:picLocks noChangeAspect="1"/>
           </p:cNvPicPr>
@@ -5004,7 +5005,7 @@
       </p:pic>
       <p:pic>
         <p:nvPicPr>
-          <p:cNvPr id="211" name="Image" descr="Image"/>
+          <p:cNvPr id="212" name="Image" descr="Image"/>
           <p:cNvPicPr>
             <a:picLocks noChangeAspect="1"/>
           </p:cNvPicPr>
@@ -5033,7 +5034,7 @@
       </p:pic>
       <p:pic>
         <p:nvPicPr>
-          <p:cNvPr id="212" name="Image" descr="Image"/>
+          <p:cNvPr id="213" name="Image" descr="Image"/>
           <p:cNvPicPr>
             <a:picLocks noChangeAspect="1"/>
           </p:cNvPicPr>
@@ -5088,7 +5089,7 @@
       </p:grpSpPr>
       <p:sp>
         <p:nvSpPr>
-          <p:cNvPr id="214" name="QUI:…"/>
+          <p:cNvPr id="215" name="QUI:…"/>
           <p:cNvSpPr txBox="1"/>
           <p:nvPr>
             <p:ph type="body" idx="1"/>
@@ -5163,7 +5164,7 @@
       </p:sp>
       <p:pic>
         <p:nvPicPr>
-          <p:cNvPr id="215" name="Image" descr="Image"/>
+          <p:cNvPr id="216" name="Image" descr="Image"/>
           <p:cNvPicPr>
             <a:picLocks noChangeAspect="1"/>
           </p:cNvPicPr>
@@ -5192,7 +5193,7 @@
       </p:pic>
       <p:pic>
         <p:nvPicPr>
-          <p:cNvPr id="216" name="Image" descr="Image"/>
+          <p:cNvPr id="217" name="Image" descr="Image"/>
           <p:cNvPicPr>
             <a:picLocks noChangeAspect="1"/>
           </p:cNvPicPr>
@@ -5247,7 +5248,7 @@
       </p:grpSpPr>
       <p:sp>
         <p:nvSpPr>
-          <p:cNvPr id="218" name="1' progetto…"/>
+          <p:cNvPr id="219" name="1' progetto…"/>
           <p:cNvSpPr txBox="1"/>
           <p:nvPr>
             <p:ph type="body" idx="1"/>
@@ -5369,7 +5370,7 @@
       </p:grpSpPr>
       <p:sp>
         <p:nvSpPr>
-          <p:cNvPr id="220" name="1' progetto (2)…"/>
+          <p:cNvPr id="221" name="1' progetto (2)…"/>
           <p:cNvSpPr txBox="1"/>
           <p:nvPr>
             <p:ph type="body" idx="1"/>
@@ -5477,7 +5478,7 @@
       </p:sp>
       <p:pic>
         <p:nvPicPr>
-          <p:cNvPr id="221" name="Image" descr="Image"/>
+          <p:cNvPr id="222" name="Image" descr="Image"/>
           <p:cNvPicPr>
             <a:picLocks noChangeAspect="1"/>
           </p:cNvPicPr>
@@ -5506,7 +5507,7 @@
       </p:pic>
       <p:pic>
         <p:nvPicPr>
-          <p:cNvPr id="222" name="Image" descr="Image"/>
+          <p:cNvPr id="223" name="Image" descr="Image"/>
           <p:cNvPicPr>
             <a:picLocks noChangeAspect="1"/>
           </p:cNvPicPr>
@@ -5535,7 +5536,7 @@
       </p:pic>
       <p:pic>
         <p:nvPicPr>
-          <p:cNvPr id="223" name="Image" descr="Image"/>
+          <p:cNvPr id="224" name="Image" descr="Image"/>
           <p:cNvPicPr>
             <a:picLocks noChangeAspect="1"/>
           </p:cNvPicPr>
@@ -5590,7 +5591,7 @@
       </p:grpSpPr>
       <p:sp>
         <p:nvSpPr>
-          <p:cNvPr id="225" name="1' progetto (3)…"/>
+          <p:cNvPr id="226" name="1' progetto (3)…"/>
           <p:cNvSpPr txBox="1"/>
           <p:nvPr>
             <p:ph type="body" idx="1"/>
@@ -5674,7 +5675,7 @@
       </p:sp>
       <p:pic>
         <p:nvPicPr>
-          <p:cNvPr id="226" name="Image" descr="Image"/>
+          <p:cNvPr id="227" name="Image" descr="Image"/>
           <p:cNvPicPr>
             <a:picLocks noChangeAspect="1"/>
           </p:cNvPicPr>
@@ -5703,7 +5704,7 @@
       </p:pic>
       <p:pic>
         <p:nvPicPr>
-          <p:cNvPr id="227" name="Image" descr="Image"/>
+          <p:cNvPr id="228" name="Image" descr="Image"/>
           <p:cNvPicPr>
             <a:picLocks noChangeAspect="1"/>
           </p:cNvPicPr>
@@ -5732,7 +5733,7 @@
       </p:pic>
       <p:pic>
         <p:nvPicPr>
-          <p:cNvPr id="228" name="Rounded Rectangle Rounded rectangle" descr="Rounded Rectangle Rounded rectangle"/>
+          <p:cNvPr id="229" name="Rounded Rectangle Rounded rectangle" descr="Rounded Rectangle Rounded rectangle"/>
           <p:cNvPicPr>
             <a:picLocks noChangeAspect="0"/>
           </p:cNvPicPr>
@@ -5758,7 +5759,7 @@
       </p:pic>
       <p:pic>
         <p:nvPicPr>
-          <p:cNvPr id="230" name="Image" descr="Image"/>
+          <p:cNvPr id="231" name="Image" descr="Image"/>
           <p:cNvPicPr>
             <a:picLocks noChangeAspect="1"/>
           </p:cNvPicPr>
@@ -5787,7 +5788,7 @@
       </p:pic>
       <p:pic>
         <p:nvPicPr>
-          <p:cNvPr id="231" name="Rounded Rectangle Rounded rectangle" descr="Rounded Rectangle Rounded rectangle"/>
+          <p:cNvPr id="232" name="Rounded Rectangle Rounded rectangle" descr="Rounded Rectangle Rounded rectangle"/>
           <p:cNvPicPr>
             <a:picLocks noChangeAspect="0"/>
           </p:cNvPicPr>
@@ -5839,7 +5840,7 @@
       </p:grpSpPr>
       <p:sp>
         <p:nvSpPr>
-          <p:cNvPr id="234" name="1' progetto (4)…"/>
+          <p:cNvPr id="235" name="1' progetto (4)…"/>
           <p:cNvSpPr txBox="1"/>
           <p:nvPr>
             <p:ph type="body" idx="1"/>
@@ -5887,7 +5888,7 @@
       </p:sp>
       <p:pic>
         <p:nvPicPr>
-          <p:cNvPr id="235" name="Image" descr="Image"/>
+          <p:cNvPr id="236" name="Image" descr="Image"/>
           <p:cNvPicPr>
             <a:picLocks noChangeAspect="1"/>
           </p:cNvPicPr>
@@ -5942,7 +5943,7 @@
       </p:grpSpPr>
       <p:sp>
         <p:nvSpPr>
-          <p:cNvPr id="237" name="1' progetto (5) tips and tricks.…"/>
+          <p:cNvPr id="238" name="1' progetto (5) tips and tricks.…"/>
           <p:cNvSpPr txBox="1"/>
           <p:nvPr>
             <p:ph type="body" idx="1"/>
@@ -6032,7 +6033,7 @@
       </p:sp>
       <p:pic>
         <p:nvPicPr>
-          <p:cNvPr id="238" name="Image" descr="Image"/>
+          <p:cNvPr id="239" name="Image" descr="Image"/>
           <p:cNvPicPr>
             <a:picLocks noChangeAspect="1"/>
           </p:cNvPicPr>
@@ -6061,7 +6062,7 @@
       </p:pic>
       <p:pic>
         <p:nvPicPr>
-          <p:cNvPr id="239" name="Image" descr="Image"/>
+          <p:cNvPr id="240" name="Image" descr="Image"/>
           <p:cNvPicPr>
             <a:picLocks noChangeAspect="1"/>
           </p:cNvPicPr>
@@ -6090,7 +6091,7 @@
       </p:pic>
       <p:pic>
         <p:nvPicPr>
-          <p:cNvPr id="240" name="Image" descr="Image"/>
+          <p:cNvPr id="241" name="Image" descr="Image"/>
           <p:cNvPicPr>
             <a:picLocks noChangeAspect="1"/>
           </p:cNvPicPr>
@@ -6119,7 +6120,7 @@
       </p:pic>
       <p:sp>
         <p:nvSpPr>
-          <p:cNvPr id="241" name="Dingbat X"/>
+          <p:cNvPr id="242" name="Dingbat X"/>
           <p:cNvSpPr/>
           <p:nvPr/>
         </p:nvSpPr>
@@ -6529,8 +6530,235 @@
               <a:t>4) su Windows la toolchain NON c'e', su MacOS va installata a parte, su Linux di solito gia presente</a:t>
             </a:r>
           </a:p>
+          <a:p>
+            <a:pPr marL="0" indent="0">
+              <a:buSzTx/>
+              <a:buNone/>
+              <a:defRPr sz="3400"/>
+            </a:pPr>
+            <a:r>
+              <a:rPr i="1">
+                <a:latin typeface="Helvetica"/>
+                <a:ea typeface="Helvetica"/>
+                <a:cs typeface="Helvetica"/>
+                <a:sym typeface="Helvetica"/>
+              </a:rPr>
+              <a:t>Bonus feature</a:t>
+            </a:r>
+            <a:r>
+              <a:t>: programmazione cooperativa!</a:t>
+            </a:r>
+          </a:p>
         </p:txBody>
       </p:sp>
+      <p:pic>
+        <p:nvPicPr>
+          <p:cNvPr id="175" name="Image" descr="Image"/>
+          <p:cNvPicPr>
+            <a:picLocks noChangeAspect="1"/>
+          </p:cNvPicPr>
+          <p:nvPr/>
+        </p:nvPicPr>
+        <p:blipFill>
+          <a:blip r:embed="rId2">
+            <a:extLst/>
+          </a:blip>
+          <a:stretch>
+            <a:fillRect/>
+          </a:stretch>
+        </p:blipFill>
+        <p:spPr>
+          <a:xfrm>
+            <a:off x="11011670" y="7746533"/>
+            <a:ext cx="1892839" cy="1892839"/>
+          </a:xfrm>
+          <a:prstGeom prst="rect">
+            <a:avLst/>
+          </a:prstGeom>
+          <a:ln w="12700">
+            <a:miter lim="400000"/>
+          </a:ln>
+        </p:spPr>
+      </p:pic>
+    </p:spTree>
+  </p:cSld>
+  <p:clrMapOvr>
+    <a:masterClrMapping/>
+  </p:clrMapOvr>
+  <p:transition xmlns:p14="http://schemas.microsoft.com/office/powerpoint/2010/main" spd="med" advClick="1"/>
+</p:sld>
+</file>
+
+<file path=ppt/slides/slide20.xml><?xml version="1.0" encoding="utf-8"?>
+<p:sld xmlns:a="http://schemas.openxmlformats.org/drawingml/2006/main" xmlns:r="http://schemas.openxmlformats.org/officeDocument/2006/relationships" xmlns:p="http://schemas.openxmlformats.org/presentationml/2006/main" xmlns:m="http://schemas.openxmlformats.org/officeDocument/2006/math" xmlns:a14="http://schemas.microsoft.com/office/drawing/2010/main" showMasterSp="1" showMasterPhAnim="1">
+  <p:cSld>
+    <p:spTree>
+      <p:nvGrpSpPr>
+        <p:cNvPr id="1" name=""/>
+        <p:cNvGrpSpPr/>
+        <p:nvPr/>
+      </p:nvGrpSpPr>
+      <p:grpSpPr>
+        <a:xfrm>
+          <a:off x="0" y="0"/>
+          <a:ext cx="0" cy="0"/>
+          <a:chOff x="0" y="0"/>
+          <a:chExt cx="0" cy="0"/>
+        </a:xfrm>
+      </p:grpSpPr>
+      <p:sp>
+        <p:nvSpPr>
+          <p:cNvPr id="244" name="&quot;Code with Me&quot;…"/>
+          <p:cNvSpPr txBox="1"/>
+          <p:nvPr>
+            <p:ph type="body" idx="1"/>
+          </p:nvPr>
+        </p:nvSpPr>
+        <p:spPr>
+          <a:xfrm>
+            <a:off x="481749" y="492608"/>
+            <a:ext cx="11570551" cy="8397392"/>
+          </a:xfrm>
+          <a:prstGeom prst="rect">
+            <a:avLst/>
+          </a:prstGeom>
+        </p:spPr>
+        <p:txBody>
+          <a:bodyPr anchor="t">
+            <a:noAutofit/>
+          </a:bodyPr>
+          <a:lstStyle/>
+          <a:p>
+            <a:pPr marL="0" indent="0">
+              <a:buSzTx/>
+              <a:buNone/>
+              <a:defRPr b="1">
+                <a:latin typeface="Helvetica"/>
+                <a:ea typeface="Helvetica"/>
+                <a:cs typeface="Helvetica"/>
+                <a:sym typeface="Helvetica"/>
+              </a:defRPr>
+            </a:pPr>
+            <a:r>
+              <a:t>"Code with Me"</a:t>
+            </a:r>
+          </a:p>
+          <a:p>
+            <a:pPr marL="0" indent="0">
+              <a:buSzTx/>
+              <a:buNone/>
+            </a:pPr>
+          </a:p>
+          <a:p>
+            <a:pPr marL="0" indent="0">
+              <a:buSzTx/>
+              <a:buNone/>
+            </a:pPr>
+            <a:r>
+              <a:t>Potete chattare, vedere codice, editare con i vs compagni lo stesso progetto senza altri tool! </a:t>
+            </a:r>
+          </a:p>
+          <a:p>
+            <a:pPr marL="0" indent="0">
+              <a:buSzTx/>
+              <a:buNone/>
+            </a:pPr>
+          </a:p>
+          <a:p>
+            <a:pPr marL="0" indent="0">
+              <a:buSzTx/>
+              <a:buNone/>
+            </a:pPr>
+          </a:p>
+        </p:txBody>
+      </p:sp>
+      <p:pic>
+        <p:nvPicPr>
+          <p:cNvPr id="245" name="Image" descr="Image"/>
+          <p:cNvPicPr>
+            <a:picLocks noChangeAspect="1"/>
+          </p:cNvPicPr>
+          <p:nvPr/>
+        </p:nvPicPr>
+        <p:blipFill>
+          <a:blip r:embed="rId2">
+            <a:extLst/>
+          </a:blip>
+          <a:stretch>
+            <a:fillRect/>
+          </a:stretch>
+        </p:blipFill>
+        <p:spPr>
+          <a:xfrm>
+            <a:off x="481749" y="492608"/>
+            <a:ext cx="4025901" cy="1778001"/>
+          </a:xfrm>
+          <a:prstGeom prst="rect">
+            <a:avLst/>
+          </a:prstGeom>
+          <a:ln w="12700">
+            <a:miter lim="400000"/>
+          </a:ln>
+        </p:spPr>
+      </p:pic>
+      <p:pic>
+        <p:nvPicPr>
+          <p:cNvPr id="246" name="Image" descr="Image"/>
+          <p:cNvPicPr>
+            <a:picLocks noChangeAspect="1"/>
+          </p:cNvPicPr>
+          <p:nvPr/>
+        </p:nvPicPr>
+        <p:blipFill>
+          <a:blip r:embed="rId3">
+            <a:extLst/>
+          </a:blip>
+          <a:stretch>
+            <a:fillRect/>
+          </a:stretch>
+        </p:blipFill>
+        <p:spPr>
+          <a:xfrm>
+            <a:off x="10659130" y="212628"/>
+            <a:ext cx="1892839" cy="1892839"/>
+          </a:xfrm>
+          <a:prstGeom prst="rect">
+            <a:avLst/>
+          </a:prstGeom>
+          <a:ln w="12700">
+            <a:miter lim="400000"/>
+          </a:ln>
+        </p:spPr>
+      </p:pic>
+      <p:pic>
+        <p:nvPicPr>
+          <p:cNvPr id="247" name="Image" descr="Image"/>
+          <p:cNvPicPr>
+            <a:picLocks noChangeAspect="1"/>
+          </p:cNvPicPr>
+          <p:nvPr/>
+        </p:nvPicPr>
+        <p:blipFill>
+          <a:blip r:embed="rId4">
+            <a:extLst/>
+          </a:blip>
+          <a:stretch>
+            <a:fillRect/>
+          </a:stretch>
+        </p:blipFill>
+        <p:spPr>
+          <a:xfrm>
+            <a:off x="1103293" y="1181100"/>
+            <a:ext cx="901701" cy="685800"/>
+          </a:xfrm>
+          <a:prstGeom prst="rect">
+            <a:avLst/>
+          </a:prstGeom>
+          <a:ln w="12700">
+            <a:miter lim="400000"/>
+          </a:ln>
+        </p:spPr>
+      </p:pic>
     </p:spTree>
   </p:cSld>
   <p:clrMapOvr>
@@ -6559,7 +6787,7 @@
       </p:grpSpPr>
       <p:sp>
         <p:nvSpPr>
-          <p:cNvPr id="176" name="Log Story ... SHORT…"/>
+          <p:cNvPr id="177" name="Log Story ... SHORT…"/>
           <p:cNvSpPr txBox="1"/>
           <p:nvPr>
             <p:ph type="body" idx="1"/>
@@ -6735,7 +6963,7 @@
       </p:grpSpPr>
       <p:sp>
         <p:nvSpPr>
-          <p:cNvPr id="178" name="Long story....…"/>
+          <p:cNvPr id="179" name="Long story....…"/>
           <p:cNvSpPr txBox="1"/>
           <p:nvPr>
             <p:ph type="body" idx="1"/>
@@ -6827,7 +7055,7 @@
       </p:grpSpPr>
       <p:sp>
         <p:nvSpPr>
-          <p:cNvPr id="180" name="Registrarvi (Opzionale)"/>
+          <p:cNvPr id="181" name="Registrarvi (Opzionale)"/>
           <p:cNvSpPr txBox="1"/>
           <p:nvPr>
             <p:ph type="body" idx="1"/>
@@ -6868,7 +7096,7 @@
       </p:sp>
       <p:pic>
         <p:nvPicPr>
-          <p:cNvPr id="181" name="Image" descr="Image"/>
+          <p:cNvPr id="182" name="Image" descr="Image"/>
           <p:cNvPicPr>
             <a:picLocks noChangeAspect="1"/>
           </p:cNvPicPr>
@@ -6924,7 +7152,7 @@
       </p:grpSpPr>
       <p:sp>
         <p:nvSpPr>
-          <p:cNvPr id="183" name="Download..…"/>
+          <p:cNvPr id="184" name="Download..…"/>
           <p:cNvSpPr txBox="1"/>
           <p:nvPr>
             <p:ph type="body" idx="1"/>
@@ -7019,7 +7247,7 @@
       </p:sp>
       <p:pic>
         <p:nvPicPr>
-          <p:cNvPr id="184" name="Image" descr="Image"/>
+          <p:cNvPr id="185" name="Image" descr="Image"/>
           <p:cNvPicPr>
             <a:picLocks noChangeAspect="1"/>
           </p:cNvPicPr>
@@ -7048,7 +7276,7 @@
       </p:pic>
       <p:pic>
         <p:nvPicPr>
-          <p:cNvPr id="185" name="Image" descr="Image"/>
+          <p:cNvPr id="186" name="Image" descr="Image"/>
           <p:cNvPicPr>
             <a:picLocks noChangeAspect="1"/>
           </p:cNvPicPr>
@@ -7077,7 +7305,7 @@
       </p:pic>
       <p:pic>
         <p:nvPicPr>
-          <p:cNvPr id="186" name="Image" descr="Image"/>
+          <p:cNvPr id="187" name="Image" descr="Image"/>
           <p:cNvPicPr>
             <a:picLocks noChangeAspect="1"/>
           </p:cNvPicPr>
@@ -7132,7 +7360,7 @@
       </p:grpSpPr>
       <p:sp>
         <p:nvSpPr>
-          <p:cNvPr id="188" name="Installazione.. screen…"/>
+          <p:cNvPr id="189" name="Installazione.. screen…"/>
           <p:cNvSpPr txBox="1"/>
           <p:nvPr>
             <p:ph type="body" idx="1"/>
@@ -7222,7 +7450,7 @@
       </p:sp>
       <p:pic>
         <p:nvPicPr>
-          <p:cNvPr id="189" name="Image" descr="Image"/>
+          <p:cNvPr id="190" name="Image" descr="Image"/>
           <p:cNvPicPr>
             <a:picLocks noChangeAspect="1"/>
           </p:cNvPicPr>
@@ -7251,7 +7479,7 @@
       </p:pic>
       <p:pic>
         <p:nvPicPr>
-          <p:cNvPr id="190" name="Image" descr="Image"/>
+          <p:cNvPr id="191" name="Image" descr="Image"/>
           <p:cNvPicPr>
             <a:picLocks noChangeAspect="1"/>
           </p:cNvPicPr>
@@ -7306,7 +7534,7 @@
       </p:grpSpPr>
       <p:sp>
         <p:nvSpPr>
-          <p:cNvPr id="192" name="Opzioni…"/>
+          <p:cNvPr id="193" name="Opzioni…"/>
           <p:cNvSpPr txBox="1"/>
           <p:nvPr>
             <p:ph type="body" idx="1"/>
@@ -7390,7 +7618,7 @@
       </p:sp>
       <p:pic>
         <p:nvPicPr>
-          <p:cNvPr id="193" name="Image" descr="Image"/>
+          <p:cNvPr id="194" name="Image" descr="Image"/>
           <p:cNvPicPr>
             <a:picLocks noChangeAspect="1"/>
           </p:cNvPicPr>
@@ -7419,7 +7647,7 @@
       </p:pic>
       <p:pic>
         <p:nvPicPr>
-          <p:cNvPr id="194" name="Image" descr="Image"/>
+          <p:cNvPr id="195" name="Image" descr="Image"/>
           <p:cNvPicPr>
             <a:picLocks noChangeAspect="1"/>
           </p:cNvPicPr>
@@ -7474,7 +7702,7 @@
       </p:grpSpPr>
       <p:sp>
         <p:nvSpPr>
-          <p:cNvPr id="196" name="Done..…"/>
+          <p:cNvPr id="197" name="Done..…"/>
           <p:cNvSpPr txBox="1"/>
           <p:nvPr>
             <p:ph type="body" idx="1"/>
@@ -7575,7 +7803,7 @@
       </p:sp>
       <p:pic>
         <p:nvPicPr>
-          <p:cNvPr id="197" name="Image" descr="Image"/>
+          <p:cNvPr id="198" name="Image" descr="Image"/>
           <p:cNvPicPr>
             <a:picLocks noChangeAspect="1"/>
           </p:cNvPicPr>

</xml_diff>